<commit_message>
Fix left over contents of WireFrame
Fix left over contents of WireFrame
</commit_message>
<xml_diff>
--- a/Documents/TextRPG_와이어프레임.pptx
+++ b/Documents/TextRPG_와이어프레임.pptx
@@ -7641,7 +7641,7 @@
         <p:spPr>
           <a:xfrm>
             <a:off x="801063" y="872703"/>
-            <a:ext cx="7510389" cy="5867697"/>
+            <a:ext cx="5751896" cy="4953279"/>
           </a:xfrm>
           <a:prstGeom prst="rect">
             <a:avLst/>
@@ -7776,19 +7776,11 @@
             </a:pPr>
             <a:r>
               <a:rPr lang="ko-KR" altLang="en-US" sz="1400" dirty="0"/>
-              <a:t>방어력 </a:t>
+              <a:t>현재 </a:t>
             </a:r>
             <a:r>
               <a:rPr lang="en-US" altLang="ko-KR" sz="1400" dirty="0"/>
-              <a:t>[</a:t>
-            </a:r>
-            <a:r>
-              <a:rPr lang="ko-KR" altLang="en-US" sz="1400" dirty="0"/>
-              <a:t>데미지를 방어력으로 나눈다</a:t>
-            </a:r>
-            <a:r>
-              <a:rPr lang="en-US" altLang="ko-KR" sz="1400" dirty="0"/>
-              <a:t>.]</a:t>
+              <a:t>BP</a:t>
             </a:r>
           </a:p>
           <a:p>
@@ -7800,28 +7792,16 @@
               <a:buChar char="•"/>
             </a:pPr>
             <a:r>
-              <a:rPr lang="ko-KR" altLang="en-US" sz="1400" dirty="0" err="1"/>
-              <a:t>스텟</a:t>
-            </a:r>
-            <a:r>
               <a:rPr lang="ko-KR" altLang="en-US" sz="1400" dirty="0"/>
-              <a:t> 랭크</a:t>
+              <a:t>최소 </a:t>
             </a:r>
             <a:r>
               <a:rPr lang="en-US" altLang="ko-KR" sz="1400" dirty="0"/>
-              <a:t>(Ref. </a:t>
-            </a:r>
-            <a:r>
-              <a:rPr lang="ko-KR" altLang="en-US" sz="1400" dirty="0"/>
-              <a:t>포켓몬스터</a:t>
-            </a:r>
-            <a:r>
-              <a:rPr lang="en-US" altLang="ko-KR" sz="1400" dirty="0"/>
-              <a:t>)</a:t>
-            </a:r>
-          </a:p>
-          <a:p>
-            <a:pPr marL="1257300" lvl="2" indent="-342900">
+              <a:t>BP</a:t>
+            </a:r>
+          </a:p>
+          <a:p>
+            <a:pPr marL="342900" indent="-342900">
               <a:lnSpc>
                 <a:spcPct val="150000"/>
               </a:lnSpc>
@@ -7830,31 +7810,23 @@
             </a:pPr>
             <a:r>
               <a:rPr lang="ko-KR" altLang="en-US" sz="1400" dirty="0"/>
-              <a:t>랭크 </a:t>
+              <a:t>방어력 </a:t>
             </a:r>
             <a:r>
               <a:rPr lang="en-US" altLang="ko-KR" sz="1400" dirty="0"/>
-              <a:t>+1 </a:t>
+              <a:t>[</a:t>
             </a:r>
             <a:r>
               <a:rPr lang="ko-KR" altLang="en-US" sz="1400" dirty="0"/>
-              <a:t>당 능력치의 효과가 </a:t>
+              <a:t>데미지를 방어력으로 나눈다</a:t>
             </a:r>
             <a:r>
               <a:rPr lang="en-US" altLang="ko-KR" sz="1400" dirty="0"/>
-              <a:t>25% </a:t>
-            </a:r>
-            <a:r>
-              <a:rPr lang="ko-KR" altLang="en-US" sz="1400" dirty="0"/>
-              <a:t>증가한다</a:t>
-            </a:r>
-            <a:r>
-              <a:rPr lang="en-US" altLang="ko-KR" sz="1400" dirty="0"/>
-              <a:t>.</a:t>
-            </a:r>
-          </a:p>
-          <a:p>
-            <a:pPr marL="1257300" lvl="2" indent="-342900">
+              <a:t>.]</a:t>
+            </a:r>
+          </a:p>
+          <a:p>
+            <a:pPr marL="342900" indent="-342900">
               <a:lnSpc>
                 <a:spcPct val="150000"/>
               </a:lnSpc>
@@ -7862,51 +7834,60 @@
               <a:buChar char="•"/>
             </a:pPr>
             <a:r>
+              <a:rPr lang="ko-KR" altLang="en-US" sz="1400" dirty="0" err="1"/>
+              <a:t>스텟</a:t>
+            </a:r>
+            <a:r>
               <a:rPr lang="ko-KR" altLang="en-US" sz="1400" dirty="0"/>
-              <a:t>랭크 </a:t>
-            </a:r>
-            <a:r>
-              <a:rPr lang="en-US" altLang="ko-KR" sz="1400" dirty="0"/>
-              <a:t>-1</a:t>
-            </a:r>
-            <a:r>
-              <a:rPr lang="ko-KR" altLang="en-US" sz="1400" dirty="0"/>
-              <a:t> 당 능력치의 효율이 </a:t>
-            </a:r>
-            <a:r>
-              <a:rPr lang="en-US" altLang="ko-KR" sz="1400" dirty="0"/>
-              <a:t>25% </a:t>
-            </a:r>
-            <a:r>
-              <a:rPr lang="ko-KR" altLang="en-US" sz="1400" dirty="0"/>
-              <a:t>감소한다</a:t>
-            </a:r>
-            <a:r>
-              <a:rPr lang="en-US" altLang="ko-KR" sz="1400" dirty="0"/>
-              <a:t>.</a:t>
-            </a:r>
-            <a:br>
-              <a:rPr lang="en-US" altLang="ko-KR" sz="1400" dirty="0"/>
-            </a:br>
+              <a:t> 랭크 </a:t>
+            </a:r>
             <a:r>
               <a:rPr lang="en-US" altLang="ko-KR" sz="1400" dirty="0"/>
               <a:t>[</a:t>
             </a:r>
             <a:r>
               <a:rPr lang="ko-KR" altLang="en-US" sz="1400" dirty="0"/>
-              <a:t>능력치 적용 시 </a:t>
+              <a:t>공격력 </a:t>
             </a:r>
             <a:r>
               <a:rPr lang="en-US" altLang="ko-KR" sz="1400" dirty="0"/>
-              <a:t>Max(1, 1 + 0.25 * Rank) / Max(1, 1 – 0.25 * Rank) </a:t>
+              <a:t>/ </a:t>
             </a:r>
             <a:r>
               <a:rPr lang="ko-KR" altLang="en-US" sz="1400" dirty="0"/>
-              <a:t>곱하기</a:t>
+              <a:t>방어력 </a:t>
             </a:r>
             <a:r>
               <a:rPr lang="en-US" altLang="ko-KR" sz="1400" dirty="0"/>
-              <a:t>.]</a:t>
+              <a:t>/ </a:t>
+            </a:r>
+            <a:r>
+              <a:rPr lang="ko-KR" altLang="en-US" sz="1400" dirty="0"/>
+              <a:t>명중률 </a:t>
+            </a:r>
+            <a:r>
+              <a:rPr lang="en-US" altLang="ko-KR" sz="1400" dirty="0"/>
+              <a:t>/ </a:t>
+            </a:r>
+            <a:r>
+              <a:rPr lang="ko-KR" altLang="en-US" sz="1400" dirty="0" err="1"/>
+              <a:t>회피율</a:t>
+            </a:r>
+            <a:r>
+              <a:rPr lang="ko-KR" altLang="en-US" sz="1400" dirty="0"/>
+              <a:t> </a:t>
+            </a:r>
+            <a:r>
+              <a:rPr lang="en-US" altLang="ko-KR" sz="1400" dirty="0"/>
+              <a:t>/ </a:t>
+            </a:r>
+            <a:r>
+              <a:rPr lang="ko-KR" altLang="en-US" sz="1400" dirty="0"/>
+              <a:t>치명타 확률</a:t>
+            </a:r>
+            <a:r>
+              <a:rPr lang="en-US" altLang="ko-KR" sz="1400" dirty="0"/>
+              <a:t>]</a:t>
             </a:r>
           </a:p>
           <a:p>
@@ -7914,70 +7895,110 @@
               <a:lnSpc>
                 <a:spcPct val="150000"/>
               </a:lnSpc>
-              <a:buFont typeface="Wingdings" panose="05000000000000000000" pitchFamily="2" charset="2"/>
-              <a:buChar char="§"/>
+              <a:buFont typeface="Arial" panose="020B0604020202020204" pitchFamily="34" charset="0"/>
+              <a:buChar char="•"/>
             </a:pPr>
             <a:r>
-              <a:rPr lang="ko-KR" altLang="en-US" sz="1400" dirty="0"/>
-              <a:t>공격력</a:t>
-            </a:r>
-            <a:endParaRPr lang="en-US" altLang="ko-KR" sz="1400" dirty="0"/>
+              <a:rPr lang="en-US" altLang="ko-KR" sz="1100" dirty="0"/>
+              <a:t>(Ref. </a:t>
+            </a:r>
+            <a:r>
+              <a:rPr lang="ko-KR" altLang="en-US" sz="1100" dirty="0"/>
+              <a:t>포켓몬스터</a:t>
+            </a:r>
+            <a:r>
+              <a:rPr lang="en-US" altLang="ko-KR" sz="1100" dirty="0"/>
+              <a:t>)</a:t>
+            </a:r>
           </a:p>
           <a:p>
             <a:pPr marL="800100" lvl="1" indent="-342900">
               <a:lnSpc>
                 <a:spcPct val="150000"/>
               </a:lnSpc>
-              <a:buFont typeface="Wingdings" panose="05000000000000000000" pitchFamily="2" charset="2"/>
-              <a:buChar char="§"/>
+              <a:buFont typeface="Arial" panose="020B0604020202020204" pitchFamily="34" charset="0"/>
+              <a:buChar char="•"/>
             </a:pPr>
             <a:r>
-              <a:rPr lang="ko-KR" altLang="en-US" sz="1400" dirty="0"/>
-              <a:t>방어력</a:t>
-            </a:r>
-            <a:endParaRPr lang="en-US" altLang="ko-KR" sz="1400" dirty="0"/>
+              <a:rPr lang="ko-KR" altLang="en-US" sz="1100" dirty="0"/>
+              <a:t>랭크 </a:t>
+            </a:r>
+            <a:r>
+              <a:rPr lang="en-US" altLang="ko-KR" sz="1100" dirty="0"/>
+              <a:t>+1 </a:t>
+            </a:r>
+            <a:r>
+              <a:rPr lang="ko-KR" altLang="en-US" sz="1100" dirty="0"/>
+              <a:t>당 능력치의 효과가 </a:t>
+            </a:r>
+            <a:r>
+              <a:rPr lang="en-US" altLang="ko-KR" sz="1100" dirty="0"/>
+              <a:t>25% </a:t>
+            </a:r>
+            <a:r>
+              <a:rPr lang="ko-KR" altLang="en-US" sz="1100" dirty="0"/>
+              <a:t>증가한다</a:t>
+            </a:r>
+            <a:r>
+              <a:rPr lang="en-US" altLang="ko-KR" sz="1100" dirty="0"/>
+              <a:t>.</a:t>
+            </a:r>
           </a:p>
           <a:p>
             <a:pPr marL="800100" lvl="1" indent="-342900">
               <a:lnSpc>
                 <a:spcPct val="150000"/>
               </a:lnSpc>
-              <a:buFont typeface="Wingdings" panose="05000000000000000000" pitchFamily="2" charset="2"/>
-              <a:buChar char="§"/>
+              <a:buFont typeface="Arial" panose="020B0604020202020204" pitchFamily="34" charset="0"/>
+              <a:buChar char="•"/>
             </a:pPr>
             <a:r>
-              <a:rPr lang="ko-KR" altLang="en-US" sz="1400" dirty="0"/>
-              <a:t>명중률</a:t>
-            </a:r>
-            <a:endParaRPr lang="en-US" altLang="ko-KR" sz="1400" dirty="0"/>
-          </a:p>
-          <a:p>
-            <a:pPr marL="800100" lvl="1" indent="-342900">
-              <a:lnSpc>
-                <a:spcPct val="150000"/>
-              </a:lnSpc>
-              <a:buFont typeface="Wingdings" panose="05000000000000000000" pitchFamily="2" charset="2"/>
-              <a:buChar char="§"/>
-            </a:pPr>
-            <a:r>
-              <a:rPr lang="ko-KR" altLang="en-US" sz="1400" dirty="0" err="1"/>
-              <a:t>회피율</a:t>
-            </a:r>
-            <a:endParaRPr lang="en-US" altLang="ko-KR" sz="1400" dirty="0"/>
-          </a:p>
-          <a:p>
-            <a:pPr marL="800100" lvl="1" indent="-342900">
-              <a:lnSpc>
-                <a:spcPct val="150000"/>
-              </a:lnSpc>
-              <a:buFont typeface="Wingdings" panose="05000000000000000000" pitchFamily="2" charset="2"/>
-              <a:buChar char="§"/>
-            </a:pPr>
-            <a:r>
-              <a:rPr lang="ko-KR" altLang="en-US" sz="1400" dirty="0"/>
-              <a:t>치명타 확률</a:t>
-            </a:r>
-            <a:endParaRPr lang="en-US" altLang="ko-KR" sz="1400" dirty="0"/>
+              <a:rPr lang="ko-KR" altLang="en-US" sz="1100" dirty="0"/>
+              <a:t>랭크 </a:t>
+            </a:r>
+            <a:r>
+              <a:rPr lang="en-US" altLang="ko-KR" sz="1100" dirty="0"/>
+              <a:t>-1</a:t>
+            </a:r>
+            <a:r>
+              <a:rPr lang="ko-KR" altLang="en-US" sz="1100" dirty="0"/>
+              <a:t> 당 능력치의 효율이 </a:t>
+            </a:r>
+            <a:r>
+              <a:rPr lang="en-US" altLang="ko-KR" sz="1100" dirty="0"/>
+              <a:t>25% </a:t>
+            </a:r>
+            <a:r>
+              <a:rPr lang="ko-KR" altLang="en-US" sz="1100" dirty="0"/>
+              <a:t>감소한다</a:t>
+            </a:r>
+            <a:r>
+              <a:rPr lang="en-US" altLang="ko-KR" sz="1100" dirty="0"/>
+              <a:t>.</a:t>
+            </a:r>
+            <a:br>
+              <a:rPr lang="en-US" altLang="ko-KR" sz="1100" dirty="0"/>
+            </a:br>
+            <a:r>
+              <a:rPr lang="en-US" altLang="ko-KR" sz="1100" dirty="0"/>
+              <a:t>[</a:t>
+            </a:r>
+            <a:r>
+              <a:rPr lang="ko-KR" altLang="en-US" sz="1100" dirty="0"/>
+              <a:t>능력치 적용 시 </a:t>
+            </a:r>
+            <a:r>
+              <a:rPr lang="en-US" altLang="ko-KR" sz="1100" dirty="0"/>
+              <a:t>Max(1, 1 + 0.25 * Rank) / Max(1, 1 – 0.25 * Rank) </a:t>
+            </a:r>
+            <a:r>
+              <a:rPr lang="ko-KR" altLang="en-US" sz="1100" dirty="0"/>
+              <a:t>곱하기</a:t>
+            </a:r>
+            <a:r>
+              <a:rPr lang="en-US" altLang="ko-KR" sz="1100" dirty="0"/>
+              <a:t>.]</a:t>
+            </a:r>
           </a:p>
         </p:txBody>
       </p:sp>
@@ -9980,8 +10001,8 @@
         </p:nvSpPr>
         <p:spPr>
           <a:xfrm>
-            <a:off x="3840355" y="1242492"/>
-            <a:ext cx="2755883" cy="2312877"/>
+            <a:off x="3564620" y="1242492"/>
+            <a:ext cx="2856872" cy="2636043"/>
           </a:xfrm>
           <a:prstGeom prst="rect">
             <a:avLst/>
@@ -10020,6 +10041,39 @@
             <a:r>
               <a:rPr lang="en-US" altLang="ko-KR" sz="1400" dirty="0"/>
               <a:t>ID</a:t>
+            </a:r>
+          </a:p>
+          <a:p>
+            <a:pPr marL="342900" indent="-342900">
+              <a:lnSpc>
+                <a:spcPct val="150000"/>
+              </a:lnSpc>
+              <a:buFont typeface="Arial" panose="020B0604020202020204" pitchFamily="34" charset="0"/>
+              <a:buChar char="•"/>
+            </a:pPr>
+            <a:r>
+              <a:rPr lang="ko-KR" altLang="en-US" sz="1400" dirty="0"/>
+              <a:t>퀘스트 타입 </a:t>
+            </a:r>
+            <a:r>
+              <a:rPr lang="en-US" altLang="ko-KR" sz="1400" dirty="0"/>
+              <a:t>(</a:t>
+            </a:r>
+            <a:r>
+              <a:rPr lang="ko-KR" altLang="en-US" sz="1400" dirty="0"/>
+              <a:t>몬스터 </a:t>
+            </a:r>
+            <a:r>
+              <a:rPr lang="en-US" altLang="ko-KR" sz="1400" dirty="0"/>
+              <a:t>or </a:t>
+            </a:r>
+            <a:r>
+              <a:rPr lang="ko-KR" altLang="en-US" sz="1400" dirty="0"/>
+              <a:t>던전</a:t>
+            </a:r>
+            <a:r>
+              <a:rPr lang="en-US" altLang="ko-KR" sz="1400" dirty="0"/>
+              <a:t>)</a:t>
             </a:r>
           </a:p>
           <a:p>

</xml_diff>